<commit_message>
updtaed manual based on Jason's comment
</commit_message>
<xml_diff>
--- a/docs/Manual/Figure/ManualPlot.pptx
+++ b/docs/Manual/Figure/ManualPlot.pptx
@@ -293,7 +293,7 @@
           <a:p>
             <a:fld id="{95118352-742C-7B43-8F22-628C53C0DDC2}" type="datetimeFigureOut">
               <a:rPr lang="en-US" smtClean="0"/>
-              <a:t>10/12/15</a:t>
+              <a:t>11/14/15</a:t>
             </a:fld>
             <a:endParaRPr lang="en-US"/>
           </a:p>
@@ -463,7 +463,7 @@
           <a:p>
             <a:fld id="{95118352-742C-7B43-8F22-628C53C0DDC2}" type="datetimeFigureOut">
               <a:rPr lang="en-US" smtClean="0"/>
-              <a:t>10/12/15</a:t>
+              <a:t>11/14/15</a:t>
             </a:fld>
             <a:endParaRPr lang="en-US"/>
           </a:p>
@@ -643,7 +643,7 @@
           <a:p>
             <a:fld id="{95118352-742C-7B43-8F22-628C53C0DDC2}" type="datetimeFigureOut">
               <a:rPr lang="en-US" smtClean="0"/>
-              <a:t>10/12/15</a:t>
+              <a:t>11/14/15</a:t>
             </a:fld>
             <a:endParaRPr lang="en-US"/>
           </a:p>
@@ -813,7 +813,7 @@
           <a:p>
             <a:fld id="{95118352-742C-7B43-8F22-628C53C0DDC2}" type="datetimeFigureOut">
               <a:rPr lang="en-US" smtClean="0"/>
-              <a:t>10/12/15</a:t>
+              <a:t>11/14/15</a:t>
             </a:fld>
             <a:endParaRPr lang="en-US"/>
           </a:p>
@@ -1059,7 +1059,7 @@
           <a:p>
             <a:fld id="{95118352-742C-7B43-8F22-628C53C0DDC2}" type="datetimeFigureOut">
               <a:rPr lang="en-US" smtClean="0"/>
-              <a:t>10/12/15</a:t>
+              <a:t>11/14/15</a:t>
             </a:fld>
             <a:endParaRPr lang="en-US"/>
           </a:p>
@@ -1347,7 +1347,7 @@
           <a:p>
             <a:fld id="{95118352-742C-7B43-8F22-628C53C0DDC2}" type="datetimeFigureOut">
               <a:rPr lang="en-US" smtClean="0"/>
-              <a:t>10/12/15</a:t>
+              <a:t>11/14/15</a:t>
             </a:fld>
             <a:endParaRPr lang="en-US"/>
           </a:p>
@@ -1769,7 +1769,7 @@
           <a:p>
             <a:fld id="{95118352-742C-7B43-8F22-628C53C0DDC2}" type="datetimeFigureOut">
               <a:rPr lang="en-US" smtClean="0"/>
-              <a:t>10/12/15</a:t>
+              <a:t>11/14/15</a:t>
             </a:fld>
             <a:endParaRPr lang="en-US"/>
           </a:p>
@@ -1887,7 +1887,7 @@
           <a:p>
             <a:fld id="{95118352-742C-7B43-8F22-628C53C0DDC2}" type="datetimeFigureOut">
               <a:rPr lang="en-US" smtClean="0"/>
-              <a:t>10/12/15</a:t>
+              <a:t>11/14/15</a:t>
             </a:fld>
             <a:endParaRPr lang="en-US"/>
           </a:p>
@@ -1982,7 +1982,7 @@
           <a:p>
             <a:fld id="{95118352-742C-7B43-8F22-628C53C0DDC2}" type="datetimeFigureOut">
               <a:rPr lang="en-US" smtClean="0"/>
-              <a:t>10/12/15</a:t>
+              <a:t>11/14/15</a:t>
             </a:fld>
             <a:endParaRPr lang="en-US"/>
           </a:p>
@@ -2259,7 +2259,7 @@
           <a:p>
             <a:fld id="{95118352-742C-7B43-8F22-628C53C0DDC2}" type="datetimeFigureOut">
               <a:rPr lang="en-US" smtClean="0"/>
-              <a:t>10/12/15</a:t>
+              <a:t>11/14/15</a:t>
             </a:fld>
             <a:endParaRPr lang="en-US"/>
           </a:p>
@@ -2512,7 +2512,7 @@
           <a:p>
             <a:fld id="{95118352-742C-7B43-8F22-628C53C0DDC2}" type="datetimeFigureOut">
               <a:rPr lang="en-US" smtClean="0"/>
-              <a:t>10/12/15</a:t>
+              <a:t>11/14/15</a:t>
             </a:fld>
             <a:endParaRPr lang="en-US"/>
           </a:p>
@@ -2725,7 +2725,7 @@
           <a:p>
             <a:fld id="{95118352-742C-7B43-8F22-628C53C0DDC2}" type="datetimeFigureOut">
               <a:rPr lang="en-US" smtClean="0"/>
-              <a:t>10/12/15</a:t>
+              <a:t>11/14/15</a:t>
             </a:fld>
             <a:endParaRPr lang="en-US"/>
           </a:p>
@@ -4155,6 +4155,14 @@
               <a:r>
                 <a:rPr lang="en-US" dirty="0" err="1" smtClean="0"/>
                 <a:t>ElastoDyn</a:t>
+              </a:r>
+              <a:endParaRPr lang="en-US" dirty="0" smtClean="0"/>
+            </a:p>
+            <a:p>
+              <a:pPr algn="ctr"/>
+              <a:r>
+                <a:rPr lang="en-US" dirty="0" err="1" smtClean="0"/>
+                <a:t>ServoDyn</a:t>
               </a:r>
               <a:endParaRPr lang="en-US" dirty="0" smtClean="0"/>
             </a:p>
@@ -6513,10 +6521,6 @@
               </a:rPr>
               <a:t>Y</a:t>
             </a:r>
-            <a:endParaRPr lang="en-US" b="1" i="1" dirty="0">
-              <a:latin typeface="Times New Roman"/>
-              <a:cs typeface="Times New Roman"/>
-            </a:endParaRPr>
           </a:p>
         </p:txBody>
       </p:sp>
@@ -6558,10 +6562,10 @@
         </p:nvGrpSpPr>
         <p:grpSpPr>
           <a:xfrm>
-            <a:off x="2906713" y="1046737"/>
-            <a:ext cx="3788693" cy="5257254"/>
-            <a:chOff x="2906713" y="1046737"/>
-            <a:chExt cx="3788693" cy="5257254"/>
+            <a:off x="3120228" y="1046737"/>
+            <a:ext cx="3575178" cy="5257254"/>
+            <a:chOff x="3120228" y="1046737"/>
+            <a:chExt cx="3575178" cy="5257254"/>
           </a:xfrm>
         </p:grpSpPr>
         <p:grpSp>
@@ -6572,10 +6576,10 @@
           </p:nvGrpSpPr>
           <p:grpSpPr>
             <a:xfrm>
-              <a:off x="2906713" y="1046737"/>
-              <a:ext cx="3788693" cy="5257254"/>
-              <a:chOff x="2906713" y="1046737"/>
-              <a:chExt cx="3788693" cy="5257254"/>
+              <a:off x="3120228" y="1046737"/>
+              <a:ext cx="3575178" cy="5257254"/>
+              <a:chOff x="3120228" y="1046737"/>
+              <a:chExt cx="3575178" cy="5257254"/>
             </a:xfrm>
           </p:grpSpPr>
           <p:pic>
@@ -6707,10 +6711,6 @@
                   </a:rPr>
                   <a:t>Y</a:t>
                 </a:r>
-                <a:endParaRPr lang="en-US" b="1" i="1" dirty="0">
-                  <a:latin typeface="Times New Roman"/>
-                  <a:cs typeface="Times New Roman"/>
-                </a:endParaRPr>
               </a:p>
             </p:txBody>
           </p:sp>
@@ -6959,201 +6959,6 @@
               </p:txBody>
             </p:sp>
           </p:grpSp>
-          <p:grpSp>
-            <p:nvGrpSpPr>
-              <p:cNvPr id="27" name="Group 26"/>
-              <p:cNvGrpSpPr/>
-              <p:nvPr/>
-            </p:nvGrpSpPr>
-            <p:grpSpPr>
-              <a:xfrm rot="10018090">
-                <a:off x="2906713" y="1554642"/>
-                <a:ext cx="1385156" cy="2757512"/>
-                <a:chOff x="4691603" y="1036209"/>
-                <a:chExt cx="1385156" cy="2757512"/>
-              </a:xfrm>
-            </p:grpSpPr>
-            <p:cxnSp>
-              <p:nvCxnSpPr>
-                <p:cNvPr id="28" name="Straight Arrow Connector 27"/>
-                <p:cNvCxnSpPr/>
-                <p:nvPr/>
-              </p:nvCxnSpPr>
-              <p:spPr>
-                <a:xfrm flipV="1">
-                  <a:off x="4691603" y="2172728"/>
-                  <a:ext cx="314639" cy="535309"/>
-                </a:xfrm>
-                <a:prstGeom prst="straightConnector1">
-                  <a:avLst/>
-                </a:prstGeom>
-                <a:ln>
-                  <a:tailEnd type="arrow"/>
-                </a:ln>
-              </p:spPr>
-              <p:style>
-                <a:lnRef idx="2">
-                  <a:schemeClr val="dk1"/>
-                </a:lnRef>
-                <a:fillRef idx="0">
-                  <a:schemeClr val="dk1"/>
-                </a:fillRef>
-                <a:effectRef idx="1">
-                  <a:schemeClr val="dk1"/>
-                </a:effectRef>
-                <a:fontRef idx="minor">
-                  <a:schemeClr val="tx1"/>
-                </a:fontRef>
-              </p:style>
-            </p:cxnSp>
-            <p:cxnSp>
-              <p:nvCxnSpPr>
-                <p:cNvPr id="29" name="Straight Arrow Connector 28"/>
-                <p:cNvCxnSpPr/>
-                <p:nvPr/>
-              </p:nvCxnSpPr>
-              <p:spPr>
-                <a:xfrm>
-                  <a:off x="4691603" y="2708037"/>
-                  <a:ext cx="1385156" cy="818710"/>
-                </a:xfrm>
-                <a:prstGeom prst="straightConnector1">
-                  <a:avLst/>
-                </a:prstGeom>
-                <a:ln>
-                  <a:tailEnd type="arrow"/>
-                </a:ln>
-              </p:spPr>
-              <p:style>
-                <a:lnRef idx="2">
-                  <a:schemeClr val="dk1"/>
-                </a:lnRef>
-                <a:fillRef idx="0">
-                  <a:schemeClr val="dk1"/>
-                </a:fillRef>
-                <a:effectRef idx="1">
-                  <a:schemeClr val="dk1"/>
-                </a:effectRef>
-                <a:fontRef idx="minor">
-                  <a:schemeClr val="tx1"/>
-                </a:fontRef>
-              </p:style>
-            </p:cxnSp>
-            <p:sp>
-              <p:nvSpPr>
-                <p:cNvPr id="30" name="TextBox 29"/>
-                <p:cNvSpPr txBox="1"/>
-                <p:nvPr/>
-              </p:nvSpPr>
-              <p:spPr>
-                <a:xfrm rot="12566338">
-                  <a:off x="5160465" y="3424389"/>
-                  <a:ext cx="899297" cy="369332"/>
-                </a:xfrm>
-                <a:prstGeom prst="rect">
-                  <a:avLst/>
-                </a:prstGeom>
-                <a:noFill/>
-              </p:spPr>
-              <p:txBody>
-                <a:bodyPr wrap="square" rtlCol="0">
-                  <a:spAutoFit/>
-                </a:bodyPr>
-                <a:lstStyle/>
-                <a:p>
-                  <a:r>
-                    <a:rPr lang="en-US" b="1" i="1" dirty="0" err="1" smtClean="0">
-                      <a:latin typeface="Times New Roman"/>
-                      <a:cs typeface="Times New Roman"/>
-                    </a:rPr>
-                    <a:t>Z</a:t>
-                  </a:r>
-                  <a:r>
-                    <a:rPr lang="en-US" b="1" i="1" baseline="-25000" dirty="0" err="1" smtClean="0">
-                      <a:latin typeface="Times New Roman"/>
-                      <a:cs typeface="Times New Roman"/>
-                    </a:rPr>
-                    <a:t>r</a:t>
-                  </a:r>
-                  <a:r>
-                    <a:rPr lang="en-US" b="1" i="1" baseline="-25000" dirty="0">
-                      <a:latin typeface="Times New Roman"/>
-                      <a:cs typeface="Times New Roman"/>
-                    </a:rPr>
-                    <a:t> </a:t>
-                  </a:r>
-                  <a:r>
-                    <a:rPr lang="en-US" b="1" i="1" dirty="0" smtClean="0">
-                      <a:latin typeface="Times New Roman"/>
-                      <a:cs typeface="Times New Roman"/>
-                    </a:rPr>
-                    <a:t>at t</a:t>
-                  </a:r>
-                  <a:endParaRPr lang="en-US" b="1" i="1" baseline="-25000" dirty="0">
-                    <a:latin typeface="Times New Roman"/>
-                    <a:cs typeface="Times New Roman"/>
-                  </a:endParaRPr>
-                </a:p>
-              </p:txBody>
-            </p:sp>
-            <p:sp>
-              <p:nvSpPr>
-                <p:cNvPr id="31" name="TextBox 30"/>
-                <p:cNvSpPr txBox="1"/>
-                <p:nvPr/>
-              </p:nvSpPr>
-              <p:spPr>
-                <a:xfrm rot="17986971">
-                  <a:off x="4513037" y="1404083"/>
-                  <a:ext cx="1105080" cy="369332"/>
-                </a:xfrm>
-                <a:prstGeom prst="rect">
-                  <a:avLst/>
-                </a:prstGeom>
-                <a:noFill/>
-              </p:spPr>
-              <p:txBody>
-                <a:bodyPr wrap="square" rtlCol="0">
-                  <a:spAutoFit/>
-                </a:bodyPr>
-                <a:lstStyle/>
-                <a:p>
-                  <a:r>
-                    <a:rPr lang="en-US" b="1" i="1" dirty="0" err="1" smtClean="0">
-                      <a:latin typeface="Times New Roman"/>
-                      <a:cs typeface="Times New Roman"/>
-                    </a:rPr>
-                    <a:t>Y</a:t>
-                  </a:r>
-                  <a:r>
-                    <a:rPr lang="en-US" b="1" i="1" baseline="-25000" dirty="0" err="1" smtClean="0">
-                      <a:latin typeface="Times New Roman"/>
-                      <a:cs typeface="Times New Roman"/>
-                    </a:rPr>
-                    <a:t>r</a:t>
-                  </a:r>
-                  <a:r>
-                    <a:rPr lang="en-US" b="1" i="1" baseline="-25000" dirty="0">
-                      <a:latin typeface="Times New Roman"/>
-                      <a:cs typeface="Times New Roman"/>
-                    </a:rPr>
-                    <a:t> </a:t>
-                  </a:r>
-                  <a:r>
-                    <a:rPr lang="en-US" b="1" i="1" dirty="0" smtClean="0">
-                      <a:latin typeface="Times New Roman"/>
-                      <a:cs typeface="Times New Roman"/>
-                    </a:rPr>
-                    <a:t>at t</a:t>
-                  </a:r>
-                  <a:endParaRPr lang="en-US" b="1" i="1" baseline="-25000" dirty="0">
-                    <a:latin typeface="Times New Roman"/>
-                    <a:cs typeface="Times New Roman"/>
-                  </a:endParaRPr>
-                </a:p>
-              </p:txBody>
-            </p:sp>
-          </p:grpSp>
         </p:grpSp>
         <p:sp>
           <p:nvSpPr>
@@ -7235,49 +7040,6 @@
                 <a:rPr lang="en-US" dirty="0"/>
                 <a:t>2</a:t>
               </a:r>
-              <a:endParaRPr lang="en-US" dirty="0"/>
-            </a:p>
-          </p:txBody>
-        </p:sp>
-        <p:sp>
-          <p:nvSpPr>
-            <p:cNvPr id="35" name="Oval 34"/>
-            <p:cNvSpPr/>
-            <p:nvPr/>
-          </p:nvSpPr>
-          <p:spPr>
-            <a:xfrm>
-              <a:off x="2958176" y="2383420"/>
-              <a:ext cx="494766" cy="451339"/>
-            </a:xfrm>
-            <a:prstGeom prst="ellipse">
-              <a:avLst/>
-            </a:prstGeom>
-          </p:spPr>
-          <p:style>
-            <a:lnRef idx="1">
-              <a:schemeClr val="accent1"/>
-            </a:lnRef>
-            <a:fillRef idx="3">
-              <a:schemeClr val="accent1"/>
-            </a:fillRef>
-            <a:effectRef idx="2">
-              <a:schemeClr val="accent1"/>
-            </a:effectRef>
-            <a:fontRef idx="minor">
-              <a:schemeClr val="lt1"/>
-            </a:fontRef>
-          </p:style>
-          <p:txBody>
-            <a:bodyPr rtlCol="0" anchor="ctr"/>
-            <a:lstStyle/>
-            <a:p>
-              <a:pPr algn="ctr"/>
-              <a:r>
-                <a:rPr lang="en-US" dirty="0" smtClean="0"/>
-                <a:t>3</a:t>
-              </a:r>
-              <a:endParaRPr lang="en-US" dirty="0"/>
             </a:p>
           </p:txBody>
         </p:sp>

</xml_diff>